<commit_message>
Inclusao da RNA e alteracao dos slides
</commit_message>
<xml_diff>
--- a/Apresentação-Nielsen.pptx
+++ b/Apresentação-Nielsen.pptx
@@ -5,7 +5,7 @@
     <p:sldMasterId id="2147483684" r:id="rId1"/>
   </p:sldMasterIdLst>
   <p:notesMasterIdLst>
-    <p:notesMasterId r:id="rId24"/>
+    <p:notesMasterId r:id="rId26"/>
   </p:notesMasterIdLst>
   <p:sldIdLst>
     <p:sldId id="256" r:id="rId2"/>
@@ -27,9 +27,11 @@
     <p:sldId id="284" r:id="rId18"/>
     <p:sldId id="285" r:id="rId19"/>
     <p:sldId id="288" r:id="rId20"/>
-    <p:sldId id="286" r:id="rId21"/>
-    <p:sldId id="287" r:id="rId22"/>
-    <p:sldId id="259" r:id="rId23"/>
+    <p:sldId id="293" r:id="rId21"/>
+    <p:sldId id="294" r:id="rId22"/>
+    <p:sldId id="295" r:id="rId23"/>
+    <p:sldId id="287" r:id="rId24"/>
+    <p:sldId id="259" r:id="rId25"/>
   </p:sldIdLst>
   <p:sldSz cx="9144000" cy="6858000" type="screen4x3"/>
   <p:notesSz cx="6858000" cy="9144000"/>
@@ -229,7 +231,7 @@
           <a:p>
             <a:fld id="{CB086929-3B86-4DEC-95FB-BA93AB532A09}" type="datetimeFigureOut">
               <a:rPr lang="pt-BR" smtClean="0"/>
-              <a:t>23/01/2021</a:t>
+              <a:t>24/01/2021</a:t>
             </a:fld>
             <a:endParaRPr lang="pt-BR"/>
           </a:p>
@@ -1410,7 +1412,7 @@
             <a:fld id="{B75549C4-8810-46FA-9C90-2EC7ED129036}" type="datetimeFigureOut">
               <a:rPr lang="pt-BR" smtClean="0"/>
               <a:pPr/>
-              <a:t>23/01/2021</a:t>
+              <a:t>24/01/2021</a:t>
             </a:fld>
             <a:endParaRPr lang="pt-BR"/>
           </a:p>
@@ -1595,7 +1597,7 @@
             <a:fld id="{B75549C4-8810-46FA-9C90-2EC7ED129036}" type="datetimeFigureOut">
               <a:rPr lang="pt-BR" smtClean="0"/>
               <a:pPr/>
-              <a:t>23/01/2021</a:t>
+              <a:t>24/01/2021</a:t>
             </a:fld>
             <a:endParaRPr lang="pt-BR"/>
           </a:p>
@@ -1772,7 +1774,7 @@
             <a:fld id="{B75549C4-8810-46FA-9C90-2EC7ED129036}" type="datetimeFigureOut">
               <a:rPr lang="pt-BR" smtClean="0"/>
               <a:pPr/>
-              <a:t>23/01/2021</a:t>
+              <a:t>24/01/2021</a:t>
             </a:fld>
             <a:endParaRPr lang="pt-BR"/>
           </a:p>
@@ -1939,7 +1941,7 @@
             <a:fld id="{B75549C4-8810-46FA-9C90-2EC7ED129036}" type="datetimeFigureOut">
               <a:rPr lang="pt-BR" smtClean="0"/>
               <a:pPr/>
-              <a:t>23/01/2021</a:t>
+              <a:t>24/01/2021</a:t>
             </a:fld>
             <a:endParaRPr lang="pt-BR"/>
           </a:p>
@@ -2162,7 +2164,7 @@
             <a:fld id="{B75549C4-8810-46FA-9C90-2EC7ED129036}" type="datetimeFigureOut">
               <a:rPr lang="pt-BR" smtClean="0"/>
               <a:pPr/>
-              <a:t>23/01/2021</a:t>
+              <a:t>24/01/2021</a:t>
             </a:fld>
             <a:endParaRPr lang="pt-BR"/>
           </a:p>
@@ -2423,7 +2425,7 @@
             <a:fld id="{B75549C4-8810-46FA-9C90-2EC7ED129036}" type="datetimeFigureOut">
               <a:rPr lang="pt-BR" smtClean="0"/>
               <a:pPr/>
-              <a:t>23/01/2021</a:t>
+              <a:t>24/01/2021</a:t>
             </a:fld>
             <a:endParaRPr lang="pt-BR"/>
           </a:p>
@@ -2829,7 +2831,7 @@
             <a:fld id="{B75549C4-8810-46FA-9C90-2EC7ED129036}" type="datetimeFigureOut">
               <a:rPr lang="pt-BR" smtClean="0"/>
               <a:pPr/>
-              <a:t>23/01/2021</a:t>
+              <a:t>24/01/2021</a:t>
             </a:fld>
             <a:endParaRPr lang="pt-BR"/>
           </a:p>
@@ -2962,7 +2964,7 @@
             <a:fld id="{B75549C4-8810-46FA-9C90-2EC7ED129036}" type="datetimeFigureOut">
               <a:rPr lang="pt-BR" smtClean="0"/>
               <a:pPr/>
-              <a:t>23/01/2021</a:t>
+              <a:t>24/01/2021</a:t>
             </a:fld>
             <a:endParaRPr lang="pt-BR"/>
           </a:p>
@@ -3064,7 +3066,7 @@
             <a:fld id="{B75549C4-8810-46FA-9C90-2EC7ED129036}" type="datetimeFigureOut">
               <a:rPr lang="pt-BR" smtClean="0"/>
               <a:pPr/>
-              <a:t>23/01/2021</a:t>
+              <a:t>24/01/2021</a:t>
             </a:fld>
             <a:endParaRPr lang="pt-BR"/>
           </a:p>
@@ -3311,7 +3313,7 @@
             <a:fld id="{B75549C4-8810-46FA-9C90-2EC7ED129036}" type="datetimeFigureOut">
               <a:rPr lang="pt-BR" smtClean="0"/>
               <a:pPr/>
-              <a:t>23/01/2021</a:t>
+              <a:t>24/01/2021</a:t>
             </a:fld>
             <a:endParaRPr lang="pt-BR"/>
           </a:p>
@@ -3557,7 +3559,7 @@
             <a:fld id="{B75549C4-8810-46FA-9C90-2EC7ED129036}" type="datetimeFigureOut">
               <a:rPr lang="pt-BR" smtClean="0"/>
               <a:pPr/>
-              <a:t>23/01/2021</a:t>
+              <a:t>24/01/2021</a:t>
             </a:fld>
             <a:endParaRPr lang="pt-BR"/>
           </a:p>
@@ -4383,7 +4385,7 @@
             <a:fld id="{B75549C4-8810-46FA-9C90-2EC7ED129036}" type="datetimeFigureOut">
               <a:rPr lang="pt-BR" smtClean="0"/>
               <a:pPr/>
-              <a:t>23/01/2021</a:t>
+              <a:t>24/01/2021</a:t>
             </a:fld>
             <a:endParaRPr lang="pt-BR"/>
           </a:p>
@@ -6142,14 +6144,14 @@
           <p:nvPr>
             <p:extLst>
               <p:ext uri="{D42A27DB-BD31-4B8C-83A1-F6EECF244321}">
-                <p14:modId xmlns:p14="http://schemas.microsoft.com/office/powerpoint/2010/main" val="757670210"/>
+                <p14:modId xmlns:p14="http://schemas.microsoft.com/office/powerpoint/2010/main" val="419269226"/>
               </p:ext>
             </p:extLst>
           </p:nvPr>
         </p:nvGraphicFramePr>
         <p:xfrm>
-          <a:off x="416224" y="1641792"/>
-          <a:ext cx="8136904" cy="3200400"/>
+          <a:off x="971600" y="1828800"/>
+          <a:ext cx="6690745" cy="3657600"/>
         </p:xfrm>
         <a:graphic>
           <a:graphicData uri="http://schemas.openxmlformats.org/drawingml/2006/table">
@@ -6183,13 +6185,6 @@
                   <a:extLst>
                     <a:ext uri="{9D8B030D-6E8A-4147-A177-3AD203B41FA5}">
                       <a16:colId xmlns:a16="http://schemas.microsoft.com/office/drawing/2014/main" val="1271469065"/>
-                    </a:ext>
-                  </a:extLst>
-                </a:gridCol>
-                <a:gridCol w="1446159">
-                  <a:extLst>
-                    <a:ext uri="{9D8B030D-6E8A-4147-A177-3AD203B41FA5}">
-                      <a16:colId xmlns:a16="http://schemas.microsoft.com/office/drawing/2014/main" val="3960987582"/>
                     </a:ext>
                   </a:extLst>
                 </a:gridCol>
@@ -6245,20 +6240,6 @@
                       <a:r>
                         <a:rPr lang="pt-BR" sz="2400" dirty="0"/>
                         <a:t>RMSE</a:t>
-                      </a:r>
-                    </a:p>
-                  </a:txBody>
-                  <a:tcPr/>
-                </a:tc>
-                <a:tc>
-                  <a:txBody>
-                    <a:bodyPr/>
-                    <a:lstStyle/>
-                    <a:p>
-                      <a:pPr algn="ctr"/>
-                      <a:r>
-                        <a:rPr lang="pt-BR" sz="2400" dirty="0"/>
-                        <a:t>Score</a:t>
                       </a:r>
                     </a:p>
                   </a:txBody>
@@ -6332,19 +6313,6 @@
                   </a:txBody>
                   <a:tcPr/>
                 </a:tc>
-                <a:tc>
-                  <a:txBody>
-                    <a:bodyPr/>
-                    <a:lstStyle/>
-                    <a:p>
-                      <a:r>
-                        <a:rPr lang="pt-BR" sz="2400" dirty="0"/>
-                        <a:t>0.31</a:t>
-                      </a:r>
-                    </a:p>
-                  </a:txBody>
-                  <a:tcPr/>
-                </a:tc>
                 <a:extLst>
                   <a:ext uri="{0D108BD9-81ED-4DB2-BD59-A6C34878D82A}">
                     <a16:rowId xmlns:a16="http://schemas.microsoft.com/office/drawing/2014/main" val="2640329542"/>
@@ -6399,19 +6367,6 @@
                       <a:r>
                         <a:rPr lang="pt-BR" sz="2400" b="0" dirty="0"/>
                         <a:t>1.70</a:t>
-                      </a:r>
-                    </a:p>
-                  </a:txBody>
-                  <a:tcPr/>
-                </a:tc>
-                <a:tc>
-                  <a:txBody>
-                    <a:bodyPr/>
-                    <a:lstStyle/>
-                    <a:p>
-                      <a:r>
-                        <a:rPr lang="pt-BR" sz="2400" dirty="0"/>
-                        <a:t>0.70</a:t>
                       </a:r>
                     </a:p>
                   </a:txBody>
@@ -6497,19 +6452,6 @@
                   </a:txBody>
                   <a:tcPr/>
                 </a:tc>
-                <a:tc>
-                  <a:txBody>
-                    <a:bodyPr/>
-                    <a:lstStyle/>
-                    <a:p>
-                      <a:r>
-                        <a:rPr lang="pt-BR" sz="2400" b="0" dirty="0"/>
-                        <a:t>0.71</a:t>
-                      </a:r>
-                    </a:p>
-                  </a:txBody>
-                  <a:tcPr/>
-                </a:tc>
                 <a:extLst>
                   <a:ext uri="{0D108BD9-81ED-4DB2-BD59-A6C34878D82A}">
                     <a16:rowId xmlns:a16="http://schemas.microsoft.com/office/drawing/2014/main" val="4251530687"/>
@@ -6564,19 +6506,6 @@
                       <a:r>
                         <a:rPr lang="pt-BR" sz="2400" dirty="0"/>
                         <a:t>1.70</a:t>
-                      </a:r>
-                    </a:p>
-                  </a:txBody>
-                  <a:tcPr/>
-                </a:tc>
-                <a:tc>
-                  <a:txBody>
-                    <a:bodyPr/>
-                    <a:lstStyle/>
-                    <a:p>
-                      <a:r>
-                        <a:rPr lang="pt-BR" sz="2400" dirty="0"/>
-                        <a:t>0.70</a:t>
                       </a:r>
                     </a:p>
                   </a:txBody>
@@ -6641,19 +6570,6 @@
                   </a:txBody>
                   <a:tcPr/>
                 </a:tc>
-                <a:tc>
-                  <a:txBody>
-                    <a:bodyPr/>
-                    <a:lstStyle/>
-                    <a:p>
-                      <a:r>
-                        <a:rPr lang="pt-BR" sz="2400" b="0" dirty="0"/>
-                        <a:t>0.43</a:t>
-                      </a:r>
-                    </a:p>
-                  </a:txBody>
-                  <a:tcPr/>
-                </a:tc>
                 <a:extLst>
                   <a:ext uri="{0D108BD9-81ED-4DB2-BD59-A6C34878D82A}">
                     <a16:rowId xmlns:a16="http://schemas.microsoft.com/office/drawing/2014/main" val="1922026873"/>
@@ -6713,6 +6629,26 @@
                   </a:txBody>
                   <a:tcPr/>
                 </a:tc>
+                <a:extLst>
+                  <a:ext uri="{0D108BD9-81ED-4DB2-BD59-A6C34878D82A}">
+                    <a16:rowId xmlns:a16="http://schemas.microsoft.com/office/drawing/2014/main" val="200104819"/>
+                  </a:ext>
+                </a:extLst>
+              </a:tr>
+              <a:tr h="370840">
+                <a:tc>
+                  <a:txBody>
+                    <a:bodyPr/>
+                    <a:lstStyle/>
+                    <a:p>
+                      <a:r>
+                        <a:rPr lang="pt-BR" sz="2400" dirty="0"/>
+                        <a:t>Rede Neural</a:t>
+                      </a:r>
+                    </a:p>
+                  </a:txBody>
+                  <a:tcPr/>
+                </a:tc>
                 <a:tc>
                   <a:txBody>
                     <a:bodyPr/>
@@ -6720,7 +6656,33 @@
                     <a:p>
                       <a:r>
                         <a:rPr lang="pt-BR" sz="2400" b="0" dirty="0"/>
-                        <a:t>0.63</a:t>
+                        <a:t>0.38</a:t>
+                      </a:r>
+                    </a:p>
+                  </a:txBody>
+                  <a:tcPr/>
+                </a:tc>
+                <a:tc>
+                  <a:txBody>
+                    <a:bodyPr/>
+                    <a:lstStyle/>
+                    <a:p>
+                      <a:r>
+                        <a:rPr lang="pt-BR" sz="2400" dirty="0"/>
+                        <a:t>0.15</a:t>
+                      </a:r>
+                    </a:p>
+                  </a:txBody>
+                  <a:tcPr/>
+                </a:tc>
+                <a:tc>
+                  <a:txBody>
+                    <a:bodyPr/>
+                    <a:lstStyle/>
+                    <a:p>
+                      <a:r>
+                        <a:rPr lang="pt-BR" sz="2400" b="0" dirty="0"/>
+                        <a:t>0.61</a:t>
                       </a:r>
                     </a:p>
                   </a:txBody>
@@ -6728,7 +6690,7 @@
                 </a:tc>
                 <a:extLst>
                   <a:ext uri="{0D108BD9-81ED-4DB2-BD59-A6C34878D82A}">
-                    <a16:rowId xmlns:a16="http://schemas.microsoft.com/office/drawing/2014/main" val="200104819"/>
+                    <a16:rowId xmlns:a16="http://schemas.microsoft.com/office/drawing/2014/main" val="752838027"/>
                   </a:ext>
                 </a:extLst>
               </a:tr>
@@ -6804,7 +6766,7 @@
           <p:cNvPr id="3" name="Imagem 2">
             <a:extLst>
               <a:ext uri="{FF2B5EF4-FFF2-40B4-BE49-F238E27FC236}">
-                <a16:creationId xmlns:a16="http://schemas.microsoft.com/office/drawing/2014/main" id="{AE68F5FE-1A01-4FB0-8DB7-A137AC874626}"/>
+                <a16:creationId xmlns:a16="http://schemas.microsoft.com/office/drawing/2014/main" id="{1C236B38-0E47-4F5B-A6B7-B9461F666D52}"/>
               </a:ext>
             </a:extLst>
           </p:cNvPr>
@@ -6821,8 +6783,8 @@
         </p:blipFill>
         <p:spPr>
           <a:xfrm>
-            <a:off x="1197968" y="1196752"/>
-            <a:ext cx="6480720" cy="5512134"/>
+            <a:off x="1259632" y="1374602"/>
+            <a:ext cx="6192688" cy="5267150"/>
           </a:xfrm>
           <a:prstGeom prst="rect">
             <a:avLst/>
@@ -7063,7 +7025,7 @@
         </p:spPr>
         <p:txBody>
           <a:bodyPr>
-            <a:normAutofit/>
+            <a:normAutofit lnSpcReduction="10000"/>
           </a:bodyPr>
           <a:lstStyle/>
           <a:p>
@@ -7147,6 +7109,32 @@
               <a:rPr lang="pt-BR" dirty="0"/>
               <a:t> foi 100.</a:t>
             </a:r>
+          </a:p>
+          <a:p>
+            <a:r>
+              <a:rPr lang="pt-BR" dirty="0"/>
+              <a:t>A arquitetura da rede neural foi com duas camadas densas com 158 neurônicos cada uma. A função de ativação nas camadas escondidas foi a </a:t>
+            </a:r>
+            <a:r>
+              <a:rPr lang="pt-BR" dirty="0" err="1"/>
+              <a:t>Relu</a:t>
+            </a:r>
+            <a:r>
+              <a:rPr lang="pt-BR" dirty="0"/>
+              <a:t> e na saída uma função linear.</a:t>
+            </a:r>
+          </a:p>
+          <a:p>
+            <a:r>
+              <a:rPr lang="pt-BR" dirty="0"/>
+              <a:t>Número de épocas na redes foi 100.</a:t>
+            </a:r>
+          </a:p>
+          <a:p>
+            <a:pPr marL="109728" indent="0">
+              <a:buNone/>
+            </a:pPr>
+            <a:endParaRPr lang="pt-BR" dirty="0"/>
           </a:p>
           <a:p>
             <a:pPr marL="411480" lvl="1" indent="0">
@@ -7168,7 +7156,7 @@
     </p:spTree>
     <p:extLst>
       <p:ext uri="{BB962C8B-B14F-4D97-AF65-F5344CB8AC3E}">
-        <p14:creationId xmlns:p14="http://schemas.microsoft.com/office/powerpoint/2010/main" val="276600675"/>
+        <p14:creationId xmlns:p14="http://schemas.microsoft.com/office/powerpoint/2010/main" val="628968374"/>
       </p:ext>
     </p:extLst>
   </p:cSld>
@@ -7223,7 +7211,7 @@
           <a:p>
             <a:r>
               <a:rPr lang="pt-BR" dirty="0"/>
-              <a:t>Considerações finais</a:t>
+              <a:t>Avaliação cruzada na Rede Neural</a:t>
             </a:r>
           </a:p>
         </p:txBody>
@@ -7258,6 +7246,159 @@
           <a:p>
             <a:r>
               <a:rPr lang="pt-BR" dirty="0"/>
+              <a:t>Resolvemos mitigar mais a rede neural.</a:t>
+            </a:r>
+          </a:p>
+          <a:p>
+            <a:r>
+              <a:rPr lang="pt-BR" dirty="0"/>
+              <a:t>Aplicação da validação cruzada usando o método k-</a:t>
+            </a:r>
+            <a:r>
+              <a:rPr lang="pt-BR" dirty="0" err="1"/>
+              <a:t>fold</a:t>
+            </a:r>
+            <a:r>
+              <a:rPr lang="pt-BR" dirty="0"/>
+              <a:t> Cross </a:t>
+            </a:r>
+            <a:r>
+              <a:rPr lang="pt-BR" dirty="0" err="1"/>
+              <a:t>Validation</a:t>
+            </a:r>
+            <a:r>
+              <a:rPr lang="pt-BR" dirty="0"/>
+              <a:t>. </a:t>
+            </a:r>
+          </a:p>
+          <a:p>
+            <a:r>
+              <a:rPr lang="pt-BR" dirty="0"/>
+              <a:t>Media das 10 avalições foi -2.73.</a:t>
+            </a:r>
+          </a:p>
+          <a:p>
+            <a:r>
+              <a:rPr lang="pt-BR" dirty="0"/>
+              <a:t>Desvio padrão das 10 avaliações foi 0.24.</a:t>
+            </a:r>
+          </a:p>
+          <a:p>
+            <a:pPr marL="109728" indent="0">
+              <a:buNone/>
+            </a:pPr>
+            <a:endParaRPr lang="pt-BR" dirty="0"/>
+          </a:p>
+          <a:p>
+            <a:pPr marL="411480" lvl="1" indent="0">
+              <a:buNone/>
+            </a:pPr>
+            <a:endParaRPr lang="pt-BR" dirty="0"/>
+          </a:p>
+          <a:p>
+            <a:endParaRPr lang="pt-BR" dirty="0"/>
+          </a:p>
+          <a:p>
+            <a:endParaRPr lang="pt-BR" dirty="0"/>
+          </a:p>
+          <a:p>
+            <a:endParaRPr lang="pt-BR" dirty="0"/>
+          </a:p>
+        </p:txBody>
+      </p:sp>
+    </p:spTree>
+    <p:extLst>
+      <p:ext uri="{BB962C8B-B14F-4D97-AF65-F5344CB8AC3E}">
+        <p14:creationId xmlns:p14="http://schemas.microsoft.com/office/powerpoint/2010/main" val="4072710742"/>
+      </p:ext>
+    </p:extLst>
+  </p:cSld>
+  <p:clrMapOvr>
+    <a:masterClrMapping/>
+  </p:clrMapOvr>
+</p:sld>
+</file>
+
+<file path=ppt/slides/slide22.xml><?xml version="1.0" encoding="utf-8"?>
+<p:sld xmlns:a="http://schemas.openxmlformats.org/drawingml/2006/main" xmlns:r="http://schemas.openxmlformats.org/officeDocument/2006/relationships" xmlns:p="http://schemas.openxmlformats.org/presentationml/2006/main">
+  <p:cSld>
+    <p:spTree>
+      <p:nvGrpSpPr>
+        <p:cNvPr id="1" name=""/>
+        <p:cNvGrpSpPr/>
+        <p:nvPr/>
+      </p:nvGrpSpPr>
+      <p:grpSpPr>
+        <a:xfrm>
+          <a:off x="0" y="0"/>
+          <a:ext cx="0" cy="0"/>
+          <a:chOff x="0" y="0"/>
+          <a:chExt cx="0" cy="0"/>
+        </a:xfrm>
+      </p:grpSpPr>
+      <p:sp>
+        <p:nvSpPr>
+          <p:cNvPr id="2" name="Título 1">
+            <a:extLst>
+              <a:ext uri="{FF2B5EF4-FFF2-40B4-BE49-F238E27FC236}">
+                <a16:creationId xmlns:a16="http://schemas.microsoft.com/office/drawing/2014/main" id="{C6992B2C-7291-4662-95D8-20A34CCE79B0}"/>
+              </a:ext>
+            </a:extLst>
+          </p:cNvPr>
+          <p:cNvSpPr>
+            <a:spLocks noGrp="1"/>
+          </p:cNvSpPr>
+          <p:nvPr>
+            <p:ph type="title"/>
+          </p:nvPr>
+        </p:nvSpPr>
+        <p:spPr>
+          <a:xfrm>
+            <a:off x="323528" y="307802"/>
+            <a:ext cx="8229600" cy="1066800"/>
+          </a:xfrm>
+        </p:spPr>
+        <p:txBody>
+          <a:bodyPr/>
+          <a:lstStyle/>
+          <a:p>
+            <a:r>
+              <a:rPr lang="pt-BR" dirty="0"/>
+              <a:t>Considerações finais</a:t>
+            </a:r>
+          </a:p>
+        </p:txBody>
+      </p:sp>
+      <p:sp>
+        <p:nvSpPr>
+          <p:cNvPr id="3" name="Espaço Reservado para Conteúdo 2">
+            <a:extLst>
+              <a:ext uri="{FF2B5EF4-FFF2-40B4-BE49-F238E27FC236}">
+                <a16:creationId xmlns:a16="http://schemas.microsoft.com/office/drawing/2014/main" id="{C0B4F2E1-FC9D-403B-987C-8AA3757C7CB0}"/>
+              </a:ext>
+            </a:extLst>
+          </p:cNvPr>
+          <p:cNvSpPr>
+            <a:spLocks noGrp="1"/>
+          </p:cNvSpPr>
+          <p:nvPr>
+            <p:ph idx="1"/>
+          </p:nvPr>
+        </p:nvSpPr>
+        <p:spPr>
+          <a:xfrm>
+            <a:off x="323528" y="1386576"/>
+            <a:ext cx="8524150" cy="5163622"/>
+          </a:xfrm>
+        </p:spPr>
+        <p:txBody>
+          <a:bodyPr>
+            <a:normAutofit/>
+          </a:bodyPr>
+          <a:lstStyle/>
+          <a:p>
+            <a:r>
+              <a:rPr lang="pt-BR" dirty="0"/>
               <a:t>O modelo </a:t>
             </a:r>
             <a:r>
@@ -7266,7 +7407,13 @@
             </a:r>
             <a:r>
               <a:rPr lang="pt-BR" dirty="0"/>
-              <a:t> Forest apresentou melhores resultados no MSE e score. </a:t>
+              <a:t> Forest apresentou melhores resultados no MSE com relação aos métodos tradicionais.</a:t>
+            </a:r>
+          </a:p>
+          <a:p>
+            <a:r>
+              <a:rPr lang="pt-BR" dirty="0"/>
+              <a:t>A rede neural apresenta o melhor modelo para o problema.</a:t>
             </a:r>
           </a:p>
           <a:p>
@@ -7279,6 +7426,164 @@
             <a:r>
               <a:rPr lang="pt-BR" dirty="0"/>
               <a:t>Link GitHub do código-fonte em Python utilizado na avaliação: https://github.com/nielsencastelo/Analise_dados</a:t>
+            </a:r>
+          </a:p>
+          <a:p>
+            <a:endParaRPr lang="pt-BR" dirty="0"/>
+          </a:p>
+          <a:p>
+            <a:endParaRPr lang="pt-BR" dirty="0"/>
+          </a:p>
+          <a:p>
+            <a:endParaRPr lang="pt-BR" dirty="0"/>
+          </a:p>
+          <a:p>
+            <a:endParaRPr lang="pt-BR" dirty="0"/>
+          </a:p>
+        </p:txBody>
+      </p:sp>
+    </p:spTree>
+    <p:extLst>
+      <p:ext uri="{BB962C8B-B14F-4D97-AF65-F5344CB8AC3E}">
+        <p14:creationId xmlns:p14="http://schemas.microsoft.com/office/powerpoint/2010/main" val="2008402171"/>
+      </p:ext>
+    </p:extLst>
+  </p:cSld>
+  <p:clrMapOvr>
+    <a:masterClrMapping/>
+  </p:clrMapOvr>
+</p:sld>
+</file>
+
+<file path=ppt/slides/slide23.xml><?xml version="1.0" encoding="utf-8"?>
+<p:sld xmlns:a="http://schemas.openxmlformats.org/drawingml/2006/main" xmlns:r="http://schemas.openxmlformats.org/officeDocument/2006/relationships" xmlns:p="http://schemas.openxmlformats.org/presentationml/2006/main">
+  <p:cSld>
+    <p:spTree>
+      <p:nvGrpSpPr>
+        <p:cNvPr id="1" name=""/>
+        <p:cNvGrpSpPr/>
+        <p:nvPr/>
+      </p:nvGrpSpPr>
+      <p:grpSpPr>
+        <a:xfrm>
+          <a:off x="0" y="0"/>
+          <a:ext cx="0" cy="0"/>
+          <a:chOff x="0" y="0"/>
+          <a:chExt cx="0" cy="0"/>
+        </a:xfrm>
+      </p:grpSpPr>
+      <p:sp>
+        <p:nvSpPr>
+          <p:cNvPr id="2" name="Título 1">
+            <a:extLst>
+              <a:ext uri="{FF2B5EF4-FFF2-40B4-BE49-F238E27FC236}">
+                <a16:creationId xmlns:a16="http://schemas.microsoft.com/office/drawing/2014/main" id="{C6992B2C-7291-4662-95D8-20A34CCE79B0}"/>
+              </a:ext>
+            </a:extLst>
+          </p:cNvPr>
+          <p:cNvSpPr>
+            <a:spLocks noGrp="1"/>
+          </p:cNvSpPr>
+          <p:nvPr>
+            <p:ph type="title"/>
+          </p:nvPr>
+        </p:nvSpPr>
+        <p:spPr>
+          <a:xfrm>
+            <a:off x="323528" y="307802"/>
+            <a:ext cx="8229600" cy="1066800"/>
+          </a:xfrm>
+        </p:spPr>
+        <p:txBody>
+          <a:bodyPr/>
+          <a:lstStyle/>
+          <a:p>
+            <a:r>
+              <a:rPr lang="pt-BR" dirty="0"/>
+              <a:t>Considerações finais</a:t>
+            </a:r>
+          </a:p>
+        </p:txBody>
+      </p:sp>
+      <p:sp>
+        <p:nvSpPr>
+          <p:cNvPr id="3" name="Espaço Reservado para Conteúdo 2">
+            <a:extLst>
+              <a:ext uri="{FF2B5EF4-FFF2-40B4-BE49-F238E27FC236}">
+                <a16:creationId xmlns:a16="http://schemas.microsoft.com/office/drawing/2014/main" id="{C0B4F2E1-FC9D-403B-987C-8AA3757C7CB0}"/>
+              </a:ext>
+            </a:extLst>
+          </p:cNvPr>
+          <p:cNvSpPr>
+            <a:spLocks noGrp="1"/>
+          </p:cNvSpPr>
+          <p:nvPr>
+            <p:ph idx="1"/>
+          </p:nvPr>
+        </p:nvSpPr>
+        <p:spPr>
+          <a:xfrm>
+            <a:off x="323528" y="1386576"/>
+            <a:ext cx="8524150" cy="5163622"/>
+          </a:xfrm>
+        </p:spPr>
+        <p:txBody>
+          <a:bodyPr>
+            <a:normAutofit/>
+          </a:bodyPr>
+          <a:lstStyle/>
+          <a:p>
+            <a:r>
+              <a:rPr lang="pt-BR" dirty="0"/>
+              <a:t>Desenvolver uma API para o modelo.</a:t>
+            </a:r>
+          </a:p>
+          <a:p>
+            <a:r>
+              <a:rPr lang="pt-BR" dirty="0"/>
+              <a:t>Colocar o modelo em produção implementado em um Docker.</a:t>
+            </a:r>
+          </a:p>
+          <a:p>
+            <a:r>
+              <a:rPr lang="pt-BR" dirty="0"/>
+              <a:t>Utilizar </a:t>
+            </a:r>
+            <a:r>
+              <a:rPr lang="pt-BR" dirty="0" err="1"/>
+              <a:t>Flaks</a:t>
+            </a:r>
+            <a:r>
+              <a:rPr lang="pt-BR" dirty="0"/>
+              <a:t> e </a:t>
+            </a:r>
+            <a:r>
+              <a:rPr lang="pt-BR" dirty="0" err="1"/>
+              <a:t>Celery</a:t>
+            </a:r>
+            <a:r>
+              <a:rPr lang="pt-BR" dirty="0"/>
+              <a:t> para altas requisições na chamada do </a:t>
+            </a:r>
+            <a:r>
+              <a:rPr lang="pt-BR" dirty="0" err="1"/>
+              <a:t>regressor</a:t>
+            </a:r>
+            <a:r>
+              <a:rPr lang="pt-BR" dirty="0"/>
+              <a:t> através dos clientes na web.</a:t>
+            </a:r>
+          </a:p>
+          <a:p>
+            <a:r>
+              <a:rPr lang="pt-BR" dirty="0"/>
+              <a:t>Utilizar banco de dados relacionais para gerenciar a chamada e o acesso a API.</a:t>
+            </a:r>
+          </a:p>
+          <a:p>
+            <a:r>
+              <a:rPr lang="pt-BR" dirty="0"/>
+              <a:t>Criar um ambiente online onde o usuário poderá fazer seu próprio treinamento, passando como parâmetros seus falso positivos e negativos.</a:t>
             </a:r>
           </a:p>
           <a:p>
@@ -7308,7 +7613,7 @@
 </p:sld>
 </file>
 
-<file path=ppt/slides/slide22.xml><?xml version="1.0" encoding="utf-8"?>
+<file path=ppt/slides/slide24.xml><?xml version="1.0" encoding="utf-8"?>
 <p:sld xmlns:a="http://schemas.openxmlformats.org/drawingml/2006/main" xmlns:r="http://schemas.openxmlformats.org/officeDocument/2006/relationships" xmlns:p="http://schemas.openxmlformats.org/presentationml/2006/main">
   <p:cSld>
     <p:spTree>

</xml_diff>

<commit_message>
Correcoes no slide e readme
</commit_message>
<xml_diff>
--- a/Apresentação-Nielsen.pptx
+++ b/Apresentação-Nielsen.pptx
@@ -5778,7 +5778,7 @@
           <a:p>
             <a:r>
               <a:rPr lang="pt-BR" dirty="0"/>
-              <a:t>Utilizamos 6 tipos de algoritmo para regressão:</a:t>
+              <a:t>Utilizamos 7 tipos de algoritmo para regressão:</a:t>
             </a:r>
           </a:p>
           <a:p>
@@ -5834,6 +5834,13 @@
             <a:r>
               <a:rPr lang="pt-BR" dirty="0"/>
               <a:t>SVM</a:t>
+            </a:r>
+          </a:p>
+          <a:p>
+            <a:pPr lvl="1"/>
+            <a:r>
+              <a:rPr lang="pt-BR" dirty="0"/>
+              <a:t>Rede Neural</a:t>
             </a:r>
           </a:p>
           <a:p>
@@ -5946,7 +5953,7 @@
           <a:p>
             <a:r>
               <a:rPr lang="pt-BR" dirty="0"/>
-              <a:t>Para avaliar os modelos utilizou-se 4 métricas.</a:t>
+              <a:t>Para avaliar os modelos utilizou-se 3 métricas.</a:t>
             </a:r>
           </a:p>
           <a:p>
@@ -6038,16 +6045,10 @@
               <a:t>Error</a:t>
             </a:r>
             <a:r>
-              <a:rPr lang="pt-BR" dirty="0"/>
+              <a:rPr lang="pt-BR"/>
               <a:t>)</a:t>
             </a:r>
-          </a:p>
-          <a:p>
-            <a:pPr lvl="1"/>
-            <a:r>
-              <a:rPr lang="pt-BR" dirty="0"/>
-              <a:t>Score</a:t>
-            </a:r>
+            <a:endParaRPr lang="pt-BR" dirty="0"/>
           </a:p>
           <a:p>
             <a:pPr marL="411480" lvl="1" indent="0">

</xml_diff>